<commit_message>
Python version variable file is added.
</commit_message>
<xml_diff>
--- a/Learn Python.pptx
+++ b/Learn Python.pptx
@@ -250,7 +250,7 @@
           <a:p>
             <a:fld id="{8EDCEDC3-2746-496E-9089-C33CE2208F3B}" type="datetimeFigureOut">
               <a:rPr lang="en-US" smtClean="0"/>
-              <a:t>03/12/2024</a:t>
+              <a:t>03/13/2024</a:t>
             </a:fld>
             <a:endParaRPr lang="en-US"/>
           </a:p>
@@ -541,7 +541,7 @@
           <a:p>
             <a:fld id="{895FC7D7-5FEA-4D1F-9F6F-C73E03C52A10}" type="datetimeFigureOut">
               <a:rPr lang="en-US" smtClean="0"/>
-              <a:t>03/12/2024</a:t>
+              <a:t>03/13/2024</a:t>
             </a:fld>
             <a:endParaRPr lang="en-US"/>
           </a:p>
@@ -782,7 +782,7 @@
           <a:p>
             <a:fld id="{895FC7D7-5FEA-4D1F-9F6F-C73E03C52A10}" type="datetimeFigureOut">
               <a:rPr lang="en-US" smtClean="0"/>
-              <a:t>03/12/2024</a:t>
+              <a:t>03/13/2024</a:t>
             </a:fld>
             <a:endParaRPr lang="en-US"/>
           </a:p>
@@ -1027,7 +1027,7 @@
           <a:p>
             <a:fld id="{895FC7D7-5FEA-4D1F-9F6F-C73E03C52A10}" type="datetimeFigureOut">
               <a:rPr lang="en-US" smtClean="0"/>
-              <a:t>03/12/2024</a:t>
+              <a:t>03/13/2024</a:t>
             </a:fld>
             <a:endParaRPr lang="en-US"/>
           </a:p>
@@ -1218,7 +1218,7 @@
           <a:p>
             <a:fld id="{895FC7D7-5FEA-4D1F-9F6F-C73E03C52A10}" type="datetimeFigureOut">
               <a:rPr lang="en-US" smtClean="0"/>
-              <a:t>03/12/2024</a:t>
+              <a:t>03/13/2024</a:t>
             </a:fld>
             <a:endParaRPr lang="en-US"/>
           </a:p>
@@ -1555,7 +1555,7 @@
           <a:p>
             <a:fld id="{895FC7D7-5FEA-4D1F-9F6F-C73E03C52A10}" type="datetimeFigureOut">
               <a:rPr lang="en-US" smtClean="0"/>
-              <a:t>03/12/2024</a:t>
+              <a:t>03/13/2024</a:t>
             </a:fld>
             <a:endParaRPr lang="en-US"/>
           </a:p>
@@ -1859,7 +1859,7 @@
           <a:p>
             <a:fld id="{895FC7D7-5FEA-4D1F-9F6F-C73E03C52A10}" type="datetimeFigureOut">
               <a:rPr lang="en-US" smtClean="0"/>
-              <a:t>03/12/2024</a:t>
+              <a:t>03/13/2024</a:t>
             </a:fld>
             <a:endParaRPr lang="en-US"/>
           </a:p>
@@ -2281,7 +2281,7 @@
           <a:p>
             <a:fld id="{895FC7D7-5FEA-4D1F-9F6F-C73E03C52A10}" type="datetimeFigureOut">
               <a:rPr lang="en-US" smtClean="0"/>
-              <a:t>03/12/2024</a:t>
+              <a:t>03/13/2024</a:t>
             </a:fld>
             <a:endParaRPr lang="en-US"/>
           </a:p>
@@ -2399,7 +2399,7 @@
           <a:p>
             <a:fld id="{895FC7D7-5FEA-4D1F-9F6F-C73E03C52A10}" type="datetimeFigureOut">
               <a:rPr lang="en-US" smtClean="0"/>
-              <a:t>03/12/2024</a:t>
+              <a:t>03/13/2024</a:t>
             </a:fld>
             <a:endParaRPr lang="en-US"/>
           </a:p>
@@ -2494,7 +2494,7 @@
           <a:p>
             <a:fld id="{895FC7D7-5FEA-4D1F-9F6F-C73E03C52A10}" type="datetimeFigureOut">
               <a:rPr lang="en-US" smtClean="0"/>
-              <a:t>03/12/2024</a:t>
+              <a:t>03/13/2024</a:t>
             </a:fld>
             <a:endParaRPr lang="en-US"/>
           </a:p>
@@ -2767,7 +2767,7 @@
           <a:p>
             <a:fld id="{895FC7D7-5FEA-4D1F-9F6F-C73E03C52A10}" type="datetimeFigureOut">
               <a:rPr lang="en-US" smtClean="0"/>
-              <a:t>03/12/2024</a:t>
+              <a:t>03/13/2024</a:t>
             </a:fld>
             <a:endParaRPr lang="en-US"/>
           </a:p>
@@ -3050,7 +3050,7 @@
           <a:p>
             <a:fld id="{895FC7D7-5FEA-4D1F-9F6F-C73E03C52A10}" type="datetimeFigureOut">
               <a:rPr lang="en-US" smtClean="0"/>
-              <a:t>03/12/2024</a:t>
+              <a:t>03/13/2024</a:t>
             </a:fld>
             <a:endParaRPr lang="en-US"/>
           </a:p>
@@ -3320,7 +3320,7 @@
           <a:p>
             <a:fld id="{895FC7D7-5FEA-4D1F-9F6F-C73E03C52A10}" type="datetimeFigureOut">
               <a:rPr lang="en-US" smtClean="0"/>
-              <a:t>03/12/2024</a:t>
+              <a:t>03/13/2024</a:t>
             </a:fld>
             <a:endParaRPr lang="en-US"/>
           </a:p>

</xml_diff>